<commit_message>
[UP8T] Refinando a apresentação PPT
</commit_message>
<xml_diff>
--- a/docs/Projeto_Data_Lake.pptx
+++ b/docs/Projeto_Data_Lake.pptx
@@ -248,7 +248,7 @@
           <a:p>
             <a:fld id="{C67EE6B0-E26C-42FB-815E-66CFA1393FEF}" type="datetimeFigureOut">
               <a:rPr lang="pt-BR" smtClean="0"/>
-              <a:t>26/01/2024</a:t>
+              <a:t>27/01/2024</a:t>
             </a:fld>
             <a:endParaRPr lang="pt-BR"/>
           </a:p>
@@ -662,7 +662,7 @@
           <a:p>
             <a:fld id="{7F4CA86A-8A78-436D-BA9D-29C60293CAA9}" type="datetime1">
               <a:rPr lang="en-US" smtClean="0"/>
-              <a:t>1/26/2024</a:t>
+              <a:t>1/27/2024</a:t>
             </a:fld>
             <a:endParaRPr lang="en-US"/>
           </a:p>
@@ -864,7 +864,7 @@
           <a:p>
             <a:fld id="{DDB5386C-2E86-44F9-9B56-8F2E28D0ACE7}" type="datetime1">
               <a:rPr lang="en-US" smtClean="0"/>
-              <a:t>1/26/2024</a:t>
+              <a:t>1/27/2024</a:t>
             </a:fld>
             <a:endParaRPr lang="en-US"/>
           </a:p>
@@ -1076,7 +1076,7 @@
           <a:p>
             <a:fld id="{751C7779-8DD1-4040-BD47-F74001E09F3F}" type="datetime1">
               <a:rPr lang="en-US" smtClean="0"/>
-              <a:t>1/26/2024</a:t>
+              <a:t>1/27/2024</a:t>
             </a:fld>
             <a:endParaRPr lang="en-US"/>
           </a:p>
@@ -1278,7 +1278,7 @@
           <a:p>
             <a:fld id="{F3200EFC-6CD9-4DE6-B7DB-808918146B91}" type="datetime1">
               <a:rPr lang="en-US" smtClean="0"/>
-              <a:t>1/26/2024</a:t>
+              <a:t>1/27/2024</a:t>
             </a:fld>
             <a:endParaRPr lang="en-US"/>
           </a:p>
@@ -1557,7 +1557,7 @@
           <a:p>
             <a:fld id="{7FC805D9-4008-4337-98ED-3C716C46420D}" type="datetime1">
               <a:rPr lang="en-US" smtClean="0"/>
-              <a:t>1/26/2024</a:t>
+              <a:t>1/27/2024</a:t>
             </a:fld>
             <a:endParaRPr lang="en-US"/>
           </a:p>
@@ -1826,7 +1826,7 @@
           <a:p>
             <a:fld id="{D973E88E-5F51-40BD-9A51-0E2431BE083C}" type="datetime1">
               <a:rPr lang="en-US" smtClean="0"/>
-              <a:t>1/26/2024</a:t>
+              <a:t>1/27/2024</a:t>
             </a:fld>
             <a:endParaRPr lang="en-US"/>
           </a:p>
@@ -2242,7 +2242,7 @@
           <a:p>
             <a:fld id="{B2622D99-C243-4135-8EB8-1BCF1FF39F02}" type="datetime1">
               <a:rPr lang="en-US" smtClean="0"/>
-              <a:t>1/26/2024</a:t>
+              <a:t>1/27/2024</a:t>
             </a:fld>
             <a:endParaRPr lang="en-US"/>
           </a:p>
@@ -2387,7 +2387,7 @@
           <a:p>
             <a:fld id="{3F8934E3-895C-476A-B181-B53A3F9FFA2B}" type="datetime1">
               <a:rPr lang="en-US" smtClean="0"/>
-              <a:t>1/26/2024</a:t>
+              <a:t>1/27/2024</a:t>
             </a:fld>
             <a:endParaRPr lang="en-US"/>
           </a:p>
@@ -2504,7 +2504,7 @@
           <a:p>
             <a:fld id="{FF79369A-EAE9-4C77-A37F-3465D0E58C18}" type="datetime1">
               <a:rPr lang="en-US" smtClean="0"/>
-              <a:t>1/26/2024</a:t>
+              <a:t>1/27/2024</a:t>
             </a:fld>
             <a:endParaRPr lang="en-US"/>
           </a:p>
@@ -2819,7 +2819,7 @@
           <a:p>
             <a:fld id="{AB6C140E-8040-43F9-8727-820B487801D7}" type="datetime1">
               <a:rPr lang="en-US" smtClean="0"/>
-              <a:t>1/26/2024</a:t>
+              <a:t>1/27/2024</a:t>
             </a:fld>
             <a:endParaRPr lang="en-US"/>
           </a:p>
@@ -3111,7 +3111,7 @@
           <a:p>
             <a:fld id="{25836D6E-6FCE-48B5-8986-8BFB514E7F89}" type="datetime1">
               <a:rPr lang="en-US" smtClean="0"/>
-              <a:t>1/26/2024</a:t>
+              <a:t>1/27/2024</a:t>
             </a:fld>
             <a:endParaRPr lang="en-US"/>
           </a:p>
@@ -3356,7 +3356,7 @@
           <a:p>
             <a:fld id="{FDFC6E5B-083C-4588-B7D7-5CB1D8EB315E}" type="datetime1">
               <a:rPr lang="en-US" smtClean="0"/>
-              <a:t>1/26/2024</a:t>
+              <a:t>1/27/2024</a:t>
             </a:fld>
             <a:endParaRPr lang="en-US"/>
           </a:p>
@@ -4081,7 +4081,7 @@
         </p:nvGrpSpPr>
         <p:grpSpPr>
           <a:xfrm>
-            <a:off x="6792235" y="1758745"/>
+            <a:off x="6699200" y="1441757"/>
             <a:ext cx="3715180" cy="2489610"/>
             <a:chOff x="0" y="0"/>
             <a:chExt cx="4953573" cy="3319479"/>
@@ -4132,6 +4132,13 @@
               </a:stretch>
             </a:blipFill>
           </p:spPr>
+          <p:txBody>
+            <a:bodyPr/>
+            <a:lstStyle/>
+            <a:p>
+              <a:endParaRPr lang="pt-BR"/>
+            </a:p>
+          </p:txBody>
         </p:sp>
         <p:sp>
           <p:nvSpPr>
@@ -4178,6 +4185,13 @@
               </a:stretch>
             </a:blipFill>
           </p:spPr>
+          <p:txBody>
+            <a:bodyPr/>
+            <a:lstStyle/>
+            <a:p>
+              <a:endParaRPr lang="pt-BR"/>
+            </a:p>
+          </p:txBody>
         </p:sp>
         <p:sp>
           <p:nvSpPr>
@@ -4226,7 +4240,7 @@
         </p:nvSpPr>
         <p:spPr>
           <a:xfrm>
-            <a:off x="2112223" y="1999430"/>
+            <a:off x="2112223" y="1562100"/>
             <a:ext cx="2279180" cy="2248925"/>
           </a:xfrm>
           <a:custGeom>
@@ -4263,6 +4277,13 @@
             </a:stretch>
           </a:blipFill>
         </p:spPr>
+        <p:txBody>
+          <a:bodyPr/>
+          <a:lstStyle/>
+          <a:p>
+            <a:endParaRPr lang="pt-BR"/>
+          </a:p>
+        </p:txBody>
       </p:sp>
       <p:sp>
         <p:nvSpPr>
@@ -4272,7 +4293,7 @@
         </p:nvSpPr>
         <p:spPr>
           <a:xfrm>
-            <a:off x="12907714" y="2101308"/>
+            <a:off x="12735429" y="1765856"/>
             <a:ext cx="2498797" cy="2045169"/>
           </a:xfrm>
           <a:custGeom>
@@ -4309,6 +4330,13 @@
             </a:stretch>
           </a:blipFill>
         </p:spPr>
+        <p:txBody>
+          <a:bodyPr/>
+          <a:lstStyle/>
+          <a:p>
+            <a:endParaRPr lang="pt-BR"/>
+          </a:p>
+        </p:txBody>
       </p:sp>
       <p:sp>
         <p:nvSpPr>
@@ -4356,8 +4384,8 @@
         </p:nvSpPr>
         <p:spPr>
           <a:xfrm>
-            <a:off x="6699200" y="4591255"/>
-            <a:ext cx="4390281" cy="4375149"/>
+            <a:off x="6672700" y="4054617"/>
+            <a:ext cx="4390281" cy="5356659"/>
           </a:xfrm>
           <a:prstGeom prst="rect">
             <a:avLst/>
@@ -4375,7 +4403,7 @@
               </a:lnSpc>
             </a:pPr>
             <a:r>
-              <a:rPr lang="en-US" sz="2500">
+              <a:rPr lang="en-US" sz="2500" dirty="0">
                 <a:solidFill>
                   <a:srgbClr val="000000"/>
                 </a:solidFill>
@@ -4384,7 +4412,7 @@
               <a:t>AWS </a:t>
             </a:r>
             <a:r>
-              <a:rPr lang="en-US" sz="2500">
+              <a:rPr lang="en-US" sz="2500" dirty="0">
                 <a:solidFill>
                   <a:srgbClr val="000000"/>
                 </a:solidFill>
@@ -4400,14 +4428,47 @@
               </a:lnSpc>
             </a:pPr>
             <a:r>
-              <a:rPr lang="en-US" sz="2500">
-                <a:solidFill>
-                  <a:srgbClr val="000000"/>
-                </a:solidFill>
-                <a:latin typeface="Open Sans"/>
-              </a:rPr>
-              <a:t>é um serviço de orquestração</a:t>
-            </a:r>
+              <a:rPr lang="en-US" sz="2500" dirty="0">
+                <a:solidFill>
+                  <a:srgbClr val="000000"/>
+                </a:solidFill>
+                <a:latin typeface="Open Sans"/>
+              </a:rPr>
+              <a:t>é um </a:t>
+            </a:r>
+            <a:r>
+              <a:rPr lang="en-US" sz="2500" dirty="0" err="1">
+                <a:solidFill>
+                  <a:srgbClr val="000000"/>
+                </a:solidFill>
+                <a:latin typeface="Open Sans"/>
+              </a:rPr>
+              <a:t>serviço</a:t>
+            </a:r>
+            <a:r>
+              <a:rPr lang="en-US" sz="2500" dirty="0">
+                <a:solidFill>
+                  <a:srgbClr val="000000"/>
+                </a:solidFill>
+                <a:latin typeface="Open Sans"/>
+              </a:rPr>
+              <a:t> de </a:t>
+            </a:r>
+            <a:r>
+              <a:rPr lang="en-US" sz="2500" dirty="0" err="1">
+                <a:solidFill>
+                  <a:srgbClr val="000000"/>
+                </a:solidFill>
+                <a:latin typeface="Open Sans"/>
+              </a:rPr>
+              <a:t>orquestração</a:t>
+            </a:r>
+            <a:endParaRPr lang="en-US" sz="2500" dirty="0">
+              <a:solidFill>
+                <a:srgbClr val="000000"/>
+              </a:solidFill>
+              <a:latin typeface="Open Sans"/>
+            </a:endParaRPr>
           </a:p>
           <a:p>
             <a:pPr algn="ctr">
@@ -4416,7 +4477,7 @@
               </a:lnSpc>
             </a:pPr>
             <a:r>
-              <a:rPr lang="en-US" sz="2500">
+              <a:rPr lang="en-US" sz="2500" dirty="0">
                 <a:solidFill>
                   <a:srgbClr val="000000"/>
                 </a:solidFill>
@@ -4425,7 +4486,7 @@
               <a:t>de </a:t>
             </a:r>
             <a:r>
-              <a:rPr lang="en-US" sz="2500">
+              <a:rPr lang="en-US" sz="2500" dirty="0">
                 <a:solidFill>
                   <a:srgbClr val="000000"/>
                 </a:solidFill>
@@ -4434,13 +4495,31 @@
               <a:t>containers</a:t>
             </a:r>
             <a:r>
-              <a:rPr lang="en-US" sz="2500">
-                <a:solidFill>
-                  <a:srgbClr val="000000"/>
-                </a:solidFill>
-                <a:latin typeface="Open Sans"/>
-              </a:rPr>
-              <a:t> de fácil </a:t>
+              <a:rPr lang="en-US" sz="2500" dirty="0">
+                <a:solidFill>
+                  <a:srgbClr val="000000"/>
+                </a:solidFill>
+                <a:latin typeface="Open Sans"/>
+              </a:rPr>
+              <a:t> de </a:t>
+            </a:r>
+            <a:r>
+              <a:rPr lang="en-US" sz="2500" dirty="0" err="1">
+                <a:solidFill>
+                  <a:srgbClr val="000000"/>
+                </a:solidFill>
+                <a:latin typeface="Open Sans"/>
+              </a:rPr>
+              <a:t>fácil</a:t>
+            </a:r>
+            <a:r>
+              <a:rPr lang="en-US" sz="2500" dirty="0">
+                <a:solidFill>
+                  <a:srgbClr val="000000"/>
+                </a:solidFill>
+                <a:latin typeface="Open Sans"/>
+              </a:rPr>
+              <a:t> </a:t>
             </a:r>
           </a:p>
           <a:p>
@@ -4450,13 +4529,22 @@
               </a:lnSpc>
             </a:pPr>
             <a:r>
-              <a:rPr lang="en-US" sz="2500">
-                <a:solidFill>
-                  <a:srgbClr val="000000"/>
-                </a:solidFill>
-                <a:latin typeface="Open Sans"/>
-              </a:rPr>
-              <a:t>gerenciamento e </a:t>
+              <a:rPr lang="en-US" sz="2500" dirty="0" err="1">
+                <a:solidFill>
+                  <a:srgbClr val="000000"/>
+                </a:solidFill>
+                <a:latin typeface="Open Sans"/>
+              </a:rPr>
+              <a:t>gerenciamento</a:t>
+            </a:r>
+            <a:r>
+              <a:rPr lang="en-US" sz="2500" dirty="0">
+                <a:solidFill>
+                  <a:srgbClr val="000000"/>
+                </a:solidFill>
+                <a:latin typeface="Open Sans"/>
+              </a:rPr>
+              <a:t> e </a:t>
             </a:r>
           </a:p>
           <a:p>
@@ -4466,13 +4554,40 @@
               </a:lnSpc>
             </a:pPr>
             <a:r>
-              <a:rPr lang="en-US" sz="2500">
-                <a:solidFill>
-                  <a:srgbClr val="000000"/>
-                </a:solidFill>
-                <a:latin typeface="Open Sans"/>
-              </a:rPr>
-              <a:t>escalabilidade. É utilizado, </a:t>
+              <a:rPr lang="en-US" sz="2500" dirty="0" err="1">
+                <a:solidFill>
+                  <a:srgbClr val="000000"/>
+                </a:solidFill>
+                <a:latin typeface="Open Sans"/>
+              </a:rPr>
+              <a:t>escalabilidade</a:t>
+            </a:r>
+            <a:r>
+              <a:rPr lang="en-US" sz="2500" dirty="0">
+                <a:solidFill>
+                  <a:srgbClr val="000000"/>
+                </a:solidFill>
+                <a:latin typeface="Open Sans"/>
+              </a:rPr>
+              <a:t>. É </a:t>
+            </a:r>
+            <a:r>
+              <a:rPr lang="en-US" sz="2500" dirty="0" err="1">
+                <a:solidFill>
+                  <a:srgbClr val="000000"/>
+                </a:solidFill>
+                <a:latin typeface="Open Sans"/>
+              </a:rPr>
+              <a:t>utilizado</a:t>
+            </a:r>
+            <a:r>
+              <a:rPr lang="en-US" sz="2500" dirty="0">
+                <a:solidFill>
+                  <a:srgbClr val="000000"/>
+                </a:solidFill>
+                <a:latin typeface="Open Sans"/>
+              </a:rPr>
+              <a:t>, </a:t>
             </a:r>
           </a:p>
           <a:p>
@@ -4482,13 +4597,58 @@
               </a:lnSpc>
             </a:pPr>
             <a:r>
-              <a:rPr lang="en-US" sz="2500">
-                <a:solidFill>
-                  <a:srgbClr val="000000"/>
-                </a:solidFill>
-                <a:latin typeface="Open Sans"/>
-              </a:rPr>
-              <a:t>comumente, junto com o </a:t>
+              <a:rPr lang="en-US" sz="2500" dirty="0" err="1">
+                <a:solidFill>
+                  <a:srgbClr val="000000"/>
+                </a:solidFill>
+                <a:latin typeface="Open Sans"/>
+              </a:rPr>
+              <a:t>comumente</a:t>
+            </a:r>
+            <a:r>
+              <a:rPr lang="en-US" sz="2500" dirty="0">
+                <a:solidFill>
+                  <a:srgbClr val="000000"/>
+                </a:solidFill>
+                <a:latin typeface="Open Sans"/>
+              </a:rPr>
+              <a:t>, junto com o AWS </a:t>
+            </a:r>
+            <a:r>
+              <a:rPr lang="en-US" sz="2500" dirty="0" err="1">
+                <a:solidFill>
+                  <a:srgbClr val="000000"/>
+                </a:solidFill>
+                <a:latin typeface="Open Sans Italics"/>
+              </a:rPr>
+              <a:t>Fargate</a:t>
+            </a:r>
+            <a:r>
+              <a:rPr lang="en-US" sz="2500" dirty="0">
+                <a:solidFill>
+                  <a:srgbClr val="000000"/>
+                </a:solidFill>
+                <a:latin typeface="Open Sans"/>
+              </a:rPr>
+              <a:t> que </a:t>
+            </a:r>
+            <a:r>
+              <a:rPr lang="en-US" sz="2500" dirty="0" err="1">
+                <a:solidFill>
+                  <a:srgbClr val="000000"/>
+                </a:solidFill>
+                <a:latin typeface="Open Sans"/>
+              </a:rPr>
+              <a:t>executa</a:t>
+            </a:r>
+            <a:r>
+              <a:rPr lang="en-US" sz="2500" dirty="0">
+                <a:solidFill>
+                  <a:srgbClr val="000000"/>
+                </a:solidFill>
+                <a:latin typeface="Open Sans"/>
+              </a:rPr>
+              <a:t> esses </a:t>
             </a:r>
           </a:p>
           <a:p>
@@ -4498,23 +4658,38 @@
               </a:lnSpc>
             </a:pPr>
             <a:r>
-              <a:rPr lang="en-US" sz="2500">
+              <a:rPr lang="en-US" sz="2500" dirty="0">
                 <a:solidFill>
                   <a:srgbClr val="000000"/>
                 </a:solidFill>
                 <a:latin typeface="Open Sans Italics"/>
               </a:rPr>
-              <a:t>Fargate</a:t>
-            </a:r>
-            <a:r>
-              <a:rPr lang="en-US" sz="2500">
-                <a:solidFill>
-                  <a:srgbClr val="000000"/>
-                </a:solidFill>
-                <a:latin typeface="Open Sans"/>
-              </a:rPr>
-              <a:t> que executa esses </a:t>
-            </a:r>
+              <a:t>containers</a:t>
+            </a:r>
+            <a:r>
+              <a:rPr lang="en-US" sz="2500" dirty="0">
+                <a:solidFill>
+                  <a:srgbClr val="000000"/>
+                </a:solidFill>
+                <a:latin typeface="Open Sans"/>
+              </a:rPr>
+              <a:t> com </a:t>
+            </a:r>
+            <a:r>
+              <a:rPr lang="en-US" sz="2500" dirty="0" err="1">
+                <a:solidFill>
+                  <a:srgbClr val="000000"/>
+                </a:solidFill>
+                <a:latin typeface="Open Sans"/>
+              </a:rPr>
+              <a:t>configurações</a:t>
+            </a:r>
+            <a:endParaRPr lang="en-US" sz="2500" dirty="0">
+              <a:solidFill>
+                <a:srgbClr val="000000"/>
+              </a:solidFill>
+              <a:latin typeface="Open Sans"/>
+            </a:endParaRPr>
           </a:p>
           <a:p>
             <a:pPr algn="ctr">
@@ -4523,54 +4698,121 @@
               </a:lnSpc>
             </a:pPr>
             <a:r>
-              <a:rPr lang="en-US" sz="2500">
-                <a:solidFill>
-                  <a:srgbClr val="000000"/>
-                </a:solidFill>
-                <a:latin typeface="Open Sans Italics"/>
-              </a:rPr>
-              <a:t>containers</a:t>
-            </a:r>
-            <a:r>
-              <a:rPr lang="en-US" sz="2500">
-                <a:solidFill>
-                  <a:srgbClr val="000000"/>
-                </a:solidFill>
-                <a:latin typeface="Open Sans"/>
-              </a:rPr>
-              <a:t> com configurações</a:t>
-            </a:r>
-          </a:p>
-          <a:p>
-            <a:pPr algn="ctr">
-              <a:lnSpc>
-                <a:spcPts val="3500"/>
-              </a:lnSpc>
-            </a:pPr>
-            <a:r>
-              <a:rPr lang="en-US" sz="2500">
-                <a:solidFill>
-                  <a:srgbClr val="000000"/>
-                </a:solidFill>
-                <a:latin typeface="Open Sans"/>
-              </a:rPr>
-              <a:t>de servidor automáticas.</a:t>
-            </a:r>
-          </a:p>
-          <a:p>
-            <a:pPr algn="ctr">
-              <a:lnSpc>
-                <a:spcPts val="3500"/>
-              </a:lnSpc>
-            </a:pPr>
-            <a:r>
-              <a:rPr lang="en-US" sz="2500">
-                <a:solidFill>
-                  <a:srgbClr val="000000"/>
-                </a:solidFill>
-                <a:latin typeface="Open Sans"/>
-              </a:rPr>
-              <a:t>(simplificar)</a:t>
+              <a:rPr lang="en-US" sz="2500" dirty="0">
+                <a:solidFill>
+                  <a:srgbClr val="000000"/>
+                </a:solidFill>
+                <a:latin typeface="Open Sans"/>
+              </a:rPr>
+              <a:t>de </a:t>
+            </a:r>
+            <a:r>
+              <a:rPr lang="en-US" sz="2500" dirty="0" err="1">
+                <a:solidFill>
+                  <a:srgbClr val="000000"/>
+                </a:solidFill>
+                <a:latin typeface="Open Sans"/>
+              </a:rPr>
+              <a:t>servidor</a:t>
+            </a:r>
+            <a:r>
+              <a:rPr lang="en-US" sz="2500" dirty="0">
+                <a:solidFill>
+                  <a:srgbClr val="000000"/>
+                </a:solidFill>
+                <a:latin typeface="Open Sans"/>
+              </a:rPr>
+              <a:t> </a:t>
+            </a:r>
+            <a:r>
+              <a:rPr lang="en-US" sz="2500" dirty="0" err="1">
+                <a:solidFill>
+                  <a:srgbClr val="000000"/>
+                </a:solidFill>
+                <a:latin typeface="Open Sans"/>
+              </a:rPr>
+              <a:t>gerenciadas</a:t>
+            </a:r>
+            <a:r>
+              <a:rPr lang="en-US" sz="2500" dirty="0">
+                <a:solidFill>
+                  <a:srgbClr val="000000"/>
+                </a:solidFill>
+                <a:latin typeface="Open Sans"/>
+              </a:rPr>
+              <a:t> pela AWS com </a:t>
+            </a:r>
+            <a:r>
+              <a:rPr lang="en-US" sz="2500" dirty="0" err="1">
+                <a:solidFill>
+                  <a:srgbClr val="000000"/>
+                </a:solidFill>
+                <a:latin typeface="Open Sans"/>
+              </a:rPr>
+              <a:t>configurações</a:t>
+            </a:r>
+            <a:r>
+              <a:rPr lang="en-US" sz="2500" dirty="0">
+                <a:solidFill>
+                  <a:srgbClr val="000000"/>
+                </a:solidFill>
+                <a:latin typeface="Open Sans"/>
+              </a:rPr>
+              <a:t> </a:t>
+            </a:r>
+            <a:r>
+              <a:rPr lang="en-US" sz="2500" dirty="0" err="1">
+                <a:solidFill>
+                  <a:srgbClr val="000000"/>
+                </a:solidFill>
+                <a:latin typeface="Open Sans"/>
+              </a:rPr>
+              <a:t>mínimas</a:t>
+            </a:r>
+            <a:r>
+              <a:rPr lang="en-US" sz="2500" dirty="0">
+                <a:solidFill>
+                  <a:srgbClr val="000000"/>
+                </a:solidFill>
+                <a:latin typeface="Open Sans"/>
+              </a:rPr>
+              <a:t> </a:t>
+            </a:r>
+            <a:r>
+              <a:rPr lang="en-US" sz="2500" dirty="0" err="1">
+                <a:solidFill>
+                  <a:srgbClr val="000000"/>
+                </a:solidFill>
+                <a:latin typeface="Open Sans"/>
+              </a:rPr>
+              <a:t>pelo</a:t>
+            </a:r>
+            <a:r>
+              <a:rPr lang="en-US" sz="2500" dirty="0">
+                <a:solidFill>
+                  <a:srgbClr val="000000"/>
+                </a:solidFill>
+                <a:latin typeface="Open Sans"/>
+              </a:rPr>
+              <a:t> </a:t>
+            </a:r>
+            <a:r>
+              <a:rPr lang="en-US" sz="2500" dirty="0" err="1">
+                <a:solidFill>
+                  <a:srgbClr val="000000"/>
+                </a:solidFill>
+                <a:latin typeface="Open Sans"/>
+              </a:rPr>
+              <a:t>usuário</a:t>
+            </a:r>
+            <a:r>
+              <a:rPr lang="en-US" sz="2500" dirty="0">
+                <a:solidFill>
+                  <a:srgbClr val="000000"/>
+                </a:solidFill>
+                <a:latin typeface="Open Sans"/>
+              </a:rPr>
+              <a:t>.</a:t>
             </a:r>
           </a:p>
         </p:txBody>
@@ -4583,7 +4825,7 @@
         </p:nvSpPr>
         <p:spPr>
           <a:xfrm>
-            <a:off x="1258491" y="4591255"/>
+            <a:off x="1295400" y="4054617"/>
             <a:ext cx="4133404" cy="3060699"/>
           </a:xfrm>
           <a:prstGeom prst="rect">
@@ -4602,14 +4844,38 @@
               </a:lnSpc>
             </a:pPr>
             <a:r>
-              <a:rPr lang="en-US" sz="2500">
-                <a:solidFill>
-                  <a:srgbClr val="000000"/>
-                </a:solidFill>
-                <a:latin typeface="Open Sans"/>
-              </a:rPr>
-              <a:t>Serviço de computação</a:t>
-            </a:r>
+              <a:rPr lang="en-US" sz="2500" dirty="0" err="1">
+                <a:solidFill>
+                  <a:srgbClr val="000000"/>
+                </a:solidFill>
+                <a:latin typeface="Open Sans"/>
+              </a:rPr>
+              <a:t>Serviço</a:t>
+            </a:r>
+            <a:r>
+              <a:rPr lang="en-US" sz="2500" dirty="0">
+                <a:solidFill>
+                  <a:srgbClr val="000000"/>
+                </a:solidFill>
+                <a:latin typeface="Open Sans"/>
+              </a:rPr>
+              <a:t> de </a:t>
+            </a:r>
+            <a:r>
+              <a:rPr lang="en-US" sz="2500" dirty="0" err="1">
+                <a:solidFill>
+                  <a:srgbClr val="000000"/>
+                </a:solidFill>
+                <a:latin typeface="Open Sans"/>
+              </a:rPr>
+              <a:t>computação</a:t>
+            </a:r>
+            <a:endParaRPr lang="en-US" sz="2500" dirty="0">
+              <a:solidFill>
+                <a:srgbClr val="000000"/>
+              </a:solidFill>
+              <a:latin typeface="Open Sans"/>
+            </a:endParaRPr>
           </a:p>
           <a:p>
             <a:pPr algn="ctr">
@@ -4618,13 +4884,58 @@
               </a:lnSpc>
             </a:pPr>
             <a:r>
-              <a:rPr lang="en-US" sz="2500">
-                <a:solidFill>
-                  <a:srgbClr val="000000"/>
-                </a:solidFill>
-                <a:latin typeface="Open Sans"/>
-              </a:rPr>
-              <a:t>sem servidor para executar </a:t>
+              <a:rPr lang="en-US" sz="2500" dirty="0" err="1">
+                <a:solidFill>
+                  <a:srgbClr val="000000"/>
+                </a:solidFill>
+                <a:latin typeface="Open Sans"/>
+              </a:rPr>
+              <a:t>sem</a:t>
+            </a:r>
+            <a:r>
+              <a:rPr lang="en-US" sz="2500" dirty="0">
+                <a:solidFill>
+                  <a:srgbClr val="000000"/>
+                </a:solidFill>
+                <a:latin typeface="Open Sans"/>
+              </a:rPr>
+              <a:t> </a:t>
+            </a:r>
+            <a:r>
+              <a:rPr lang="en-US" sz="2500" dirty="0" err="1">
+                <a:solidFill>
+                  <a:srgbClr val="000000"/>
+                </a:solidFill>
+                <a:latin typeface="Open Sans"/>
+              </a:rPr>
+              <a:t>servidor</a:t>
+            </a:r>
+            <a:r>
+              <a:rPr lang="en-US" sz="2500" dirty="0">
+                <a:solidFill>
+                  <a:srgbClr val="000000"/>
+                </a:solidFill>
+                <a:latin typeface="Open Sans"/>
+              </a:rPr>
+              <a:t> para </a:t>
+            </a:r>
+            <a:r>
+              <a:rPr lang="en-US" sz="2500" dirty="0" err="1">
+                <a:solidFill>
+                  <a:srgbClr val="000000"/>
+                </a:solidFill>
+                <a:latin typeface="Open Sans"/>
+              </a:rPr>
+              <a:t>executar</a:t>
+            </a:r>
+            <a:r>
+              <a:rPr lang="en-US" sz="2500" dirty="0">
+                <a:solidFill>
+                  <a:srgbClr val="000000"/>
+                </a:solidFill>
+                <a:latin typeface="Open Sans"/>
+              </a:rPr>
+              <a:t> </a:t>
             </a:r>
           </a:p>
           <a:p>
@@ -4634,13 +4945,58 @@
               </a:lnSpc>
             </a:pPr>
             <a:r>
-              <a:rPr lang="en-US" sz="2500">
-                <a:solidFill>
-                  <a:srgbClr val="000000"/>
-                </a:solidFill>
-                <a:latin typeface="Open Sans"/>
-              </a:rPr>
-              <a:t>tarefas rápidas e leves </a:t>
+              <a:rPr lang="en-US" sz="2500" dirty="0" err="1">
+                <a:solidFill>
+                  <a:srgbClr val="000000"/>
+                </a:solidFill>
+                <a:latin typeface="Open Sans"/>
+              </a:rPr>
+              <a:t>tarefas</a:t>
+            </a:r>
+            <a:r>
+              <a:rPr lang="en-US" sz="2500" dirty="0">
+                <a:solidFill>
+                  <a:srgbClr val="000000"/>
+                </a:solidFill>
+                <a:latin typeface="Open Sans"/>
+              </a:rPr>
+              <a:t> </a:t>
+            </a:r>
+            <a:r>
+              <a:rPr lang="en-US" sz="2500" dirty="0" err="1">
+                <a:solidFill>
+                  <a:srgbClr val="000000"/>
+                </a:solidFill>
+                <a:latin typeface="Open Sans"/>
+              </a:rPr>
+              <a:t>rápidas</a:t>
+            </a:r>
+            <a:r>
+              <a:rPr lang="en-US" sz="2500" dirty="0">
+                <a:solidFill>
+                  <a:srgbClr val="000000"/>
+                </a:solidFill>
+                <a:latin typeface="Open Sans"/>
+              </a:rPr>
+              <a:t> e </a:t>
+            </a:r>
+            <a:r>
+              <a:rPr lang="en-US" sz="2500" dirty="0" err="1">
+                <a:solidFill>
+                  <a:srgbClr val="000000"/>
+                </a:solidFill>
+                <a:latin typeface="Open Sans"/>
+              </a:rPr>
+              <a:t>leves</a:t>
+            </a:r>
+            <a:r>
+              <a:rPr lang="en-US" sz="2500" dirty="0">
+                <a:solidFill>
+                  <a:srgbClr val="000000"/>
+                </a:solidFill>
+                <a:latin typeface="Open Sans"/>
+              </a:rPr>
+              <a:t> </a:t>
             </a:r>
           </a:p>
           <a:p>
@@ -4650,13 +5006,58 @@
               </a:lnSpc>
             </a:pPr>
             <a:r>
-              <a:rPr lang="en-US" sz="2500">
-                <a:solidFill>
-                  <a:srgbClr val="000000"/>
-                </a:solidFill>
-                <a:latin typeface="Open Sans"/>
-              </a:rPr>
-              <a:t>em resposta a algum </a:t>
+              <a:rPr lang="en-US" sz="2500" dirty="0" err="1">
+                <a:solidFill>
+                  <a:srgbClr val="000000"/>
+                </a:solidFill>
+                <a:latin typeface="Open Sans"/>
+              </a:rPr>
+              <a:t>em</a:t>
+            </a:r>
+            <a:r>
+              <a:rPr lang="en-US" sz="2500" dirty="0">
+                <a:solidFill>
+                  <a:srgbClr val="000000"/>
+                </a:solidFill>
+                <a:latin typeface="Open Sans"/>
+              </a:rPr>
+              <a:t> </a:t>
+            </a:r>
+            <a:r>
+              <a:rPr lang="en-US" sz="2500" dirty="0" err="1">
+                <a:solidFill>
+                  <a:srgbClr val="000000"/>
+                </a:solidFill>
+                <a:latin typeface="Open Sans"/>
+              </a:rPr>
+              <a:t>resposta</a:t>
+            </a:r>
+            <a:r>
+              <a:rPr lang="en-US" sz="2500" dirty="0">
+                <a:solidFill>
+                  <a:srgbClr val="000000"/>
+                </a:solidFill>
+                <a:latin typeface="Open Sans"/>
+              </a:rPr>
+              <a:t> a </a:t>
+            </a:r>
+            <a:r>
+              <a:rPr lang="en-US" sz="2500" dirty="0" err="1">
+                <a:solidFill>
+                  <a:srgbClr val="000000"/>
+                </a:solidFill>
+                <a:latin typeface="Open Sans"/>
+              </a:rPr>
+              <a:t>algum</a:t>
+            </a:r>
+            <a:r>
+              <a:rPr lang="en-US" sz="2500" dirty="0">
+                <a:solidFill>
+                  <a:srgbClr val="000000"/>
+                </a:solidFill>
+                <a:latin typeface="Open Sans"/>
+              </a:rPr>
+              <a:t> </a:t>
             </a:r>
           </a:p>
           <a:p>
@@ -4666,13 +5067,40 @@
               </a:lnSpc>
             </a:pPr>
             <a:r>
-              <a:rPr lang="en-US" sz="2500">
-                <a:solidFill>
-                  <a:srgbClr val="000000"/>
-                </a:solidFill>
-                <a:latin typeface="Open Sans"/>
-              </a:rPr>
-              <a:t>evento com recursos de </a:t>
+              <a:rPr lang="en-US" sz="2500" dirty="0" err="1">
+                <a:solidFill>
+                  <a:srgbClr val="000000"/>
+                </a:solidFill>
+                <a:latin typeface="Open Sans"/>
+              </a:rPr>
+              <a:t>evento</a:t>
+            </a:r>
+            <a:r>
+              <a:rPr lang="en-US" sz="2500" dirty="0">
+                <a:solidFill>
+                  <a:srgbClr val="000000"/>
+                </a:solidFill>
+                <a:latin typeface="Open Sans"/>
+              </a:rPr>
+              <a:t> com </a:t>
+            </a:r>
+            <a:r>
+              <a:rPr lang="en-US" sz="2500" dirty="0" err="1">
+                <a:solidFill>
+                  <a:srgbClr val="000000"/>
+                </a:solidFill>
+                <a:latin typeface="Open Sans"/>
+              </a:rPr>
+              <a:t>recursos</a:t>
+            </a:r>
+            <a:r>
+              <a:rPr lang="en-US" sz="2500" dirty="0">
+                <a:solidFill>
+                  <a:srgbClr val="000000"/>
+                </a:solidFill>
+                <a:latin typeface="Open Sans"/>
+              </a:rPr>
+              <a:t> de </a:t>
             </a:r>
           </a:p>
           <a:p>
@@ -4682,13 +5110,40 @@
               </a:lnSpc>
             </a:pPr>
             <a:r>
-              <a:rPr lang="en-US" sz="2500">
-                <a:solidFill>
-                  <a:srgbClr val="000000"/>
-                </a:solidFill>
-                <a:latin typeface="Open Sans"/>
-              </a:rPr>
-              <a:t>computação gerenciados </a:t>
+              <a:rPr lang="en-US" sz="2500" dirty="0" err="1">
+                <a:solidFill>
+                  <a:srgbClr val="000000"/>
+                </a:solidFill>
+                <a:latin typeface="Open Sans"/>
+              </a:rPr>
+              <a:t>computação</a:t>
+            </a:r>
+            <a:r>
+              <a:rPr lang="en-US" sz="2500" dirty="0">
+                <a:solidFill>
+                  <a:srgbClr val="000000"/>
+                </a:solidFill>
+                <a:latin typeface="Open Sans"/>
+              </a:rPr>
+              <a:t> </a:t>
+            </a:r>
+            <a:r>
+              <a:rPr lang="en-US" sz="2500" dirty="0" err="1">
+                <a:solidFill>
+                  <a:srgbClr val="000000"/>
+                </a:solidFill>
+                <a:latin typeface="Open Sans"/>
+              </a:rPr>
+              <a:t>gerenciados</a:t>
+            </a:r>
+            <a:r>
+              <a:rPr lang="en-US" sz="2500" dirty="0">
+                <a:solidFill>
+                  <a:srgbClr val="000000"/>
+                </a:solidFill>
+                <a:latin typeface="Open Sans"/>
+              </a:rPr>
+              <a:t> </a:t>
             </a:r>
           </a:p>
           <a:p>
@@ -4698,13 +5153,22 @@
               </a:lnSpc>
             </a:pPr>
             <a:r>
-              <a:rPr lang="en-US" sz="2500">
-                <a:solidFill>
-                  <a:srgbClr val="000000"/>
-                </a:solidFill>
-                <a:latin typeface="Open Sans"/>
-              </a:rPr>
-              <a:t>automaticamente.</a:t>
+              <a:rPr lang="en-US" sz="2500" dirty="0" err="1">
+                <a:solidFill>
+                  <a:srgbClr val="000000"/>
+                </a:solidFill>
+                <a:latin typeface="Open Sans"/>
+              </a:rPr>
+              <a:t>automaticamente</a:t>
+            </a:r>
+            <a:r>
+              <a:rPr lang="en-US" sz="2500" dirty="0">
+                <a:solidFill>
+                  <a:srgbClr val="000000"/>
+                </a:solidFill>
+                <a:latin typeface="Open Sans"/>
+              </a:rPr>
+              <a:t>.</a:t>
             </a:r>
           </a:p>
         </p:txBody>
@@ -4717,8 +5181,8 @@
         </p:nvSpPr>
         <p:spPr>
           <a:xfrm>
-            <a:off x="12001561" y="4591255"/>
-            <a:ext cx="4311104" cy="3498849"/>
+            <a:off x="11829275" y="4054617"/>
+            <a:ext cx="4311104" cy="4907818"/>
           </a:xfrm>
           <a:prstGeom prst="rect">
             <a:avLst/>
@@ -4736,16 +5200,25 @@
               </a:lnSpc>
             </a:pPr>
             <a:r>
-              <a:rPr lang="en-US" sz="2500">
-                <a:solidFill>
-                  <a:srgbClr val="000000"/>
-                </a:solidFill>
-                <a:latin typeface="Open Sans"/>
-              </a:rPr>
-              <a:t>Projeto </a:t>
-            </a:r>
-            <a:r>
-              <a:rPr lang="en-US" sz="2500">
+              <a:rPr lang="en-US" sz="2500" dirty="0" err="1">
+                <a:solidFill>
+                  <a:srgbClr val="000000"/>
+                </a:solidFill>
+                <a:latin typeface="Open Sans"/>
+              </a:rPr>
+              <a:t>Projeto</a:t>
+            </a:r>
+            <a:r>
+              <a:rPr lang="en-US" sz="2500" dirty="0">
+                <a:solidFill>
+                  <a:srgbClr val="000000"/>
+                </a:solidFill>
+                <a:latin typeface="Open Sans"/>
+              </a:rPr>
+              <a:t> </a:t>
+            </a:r>
+            <a:r>
+              <a:rPr lang="en-US" sz="2500" dirty="0">
                 <a:solidFill>
                   <a:srgbClr val="000000"/>
                 </a:solidFill>
@@ -4754,7 +5227,7 @@
               <a:t>open source</a:t>
             </a:r>
             <a:r>
-              <a:rPr lang="en-US" sz="2500">
+              <a:rPr lang="en-US" sz="2500" dirty="0">
                 <a:solidFill>
                   <a:srgbClr val="000000"/>
                 </a:solidFill>
@@ -4770,14 +5243,56 @@
               </a:lnSpc>
             </a:pPr>
             <a:r>
-              <a:rPr lang="en-US" sz="2500">
-                <a:solidFill>
-                  <a:srgbClr val="000000"/>
-                </a:solidFill>
-                <a:latin typeface="Open Sans"/>
-              </a:rPr>
-              <a:t>construção de uma estrutura</a:t>
-            </a:r>
+              <a:rPr lang="en-US" sz="2500" dirty="0" err="1">
+                <a:solidFill>
+                  <a:srgbClr val="000000"/>
+                </a:solidFill>
+                <a:latin typeface="Open Sans"/>
+              </a:rPr>
+              <a:t>construção</a:t>
+            </a:r>
+            <a:r>
+              <a:rPr lang="en-US" sz="2500" dirty="0">
+                <a:solidFill>
+                  <a:srgbClr val="000000"/>
+                </a:solidFill>
+                <a:latin typeface="Open Sans"/>
+              </a:rPr>
+              <a:t> de </a:t>
+            </a:r>
+            <a:r>
+              <a:rPr lang="en-US" sz="2500" dirty="0" err="1">
+                <a:solidFill>
+                  <a:srgbClr val="000000"/>
+                </a:solidFill>
+                <a:latin typeface="Open Sans"/>
+              </a:rPr>
+              <a:t>uma</a:t>
+            </a:r>
+            <a:r>
+              <a:rPr lang="en-US" sz="2500" dirty="0">
+                <a:solidFill>
+                  <a:srgbClr val="000000"/>
+                </a:solidFill>
+                <a:latin typeface="Open Sans"/>
+              </a:rPr>
+              <a:t> </a:t>
+            </a:r>
+            <a:r>
+              <a:rPr lang="en-US" sz="2500" dirty="0" err="1">
+                <a:solidFill>
+                  <a:srgbClr val="000000"/>
+                </a:solidFill>
+                <a:latin typeface="Open Sans"/>
+              </a:rPr>
+              <a:t>estrutura</a:t>
+            </a:r>
+            <a:endParaRPr lang="en-US" sz="2500" dirty="0">
+              <a:solidFill>
+                <a:srgbClr val="000000"/>
+              </a:solidFill>
+              <a:latin typeface="Open Sans"/>
+            </a:endParaRPr>
           </a:p>
           <a:p>
             <a:pPr algn="ctr">
@@ -4786,14 +5301,47 @@
               </a:lnSpc>
             </a:pPr>
             <a:r>
-              <a:rPr lang="en-US" sz="2500">
-                <a:solidFill>
-                  <a:srgbClr val="000000"/>
-                </a:solidFill>
-                <a:latin typeface="Open Sans"/>
-              </a:rPr>
-              <a:t>que oferece a abrangência</a:t>
-            </a:r>
+              <a:rPr lang="en-US" sz="2500" dirty="0">
+                <a:solidFill>
+                  <a:srgbClr val="000000"/>
+                </a:solidFill>
+                <a:latin typeface="Open Sans"/>
+              </a:rPr>
+              <a:t>que </a:t>
+            </a:r>
+            <a:r>
+              <a:rPr lang="en-US" sz="2500" dirty="0" err="1">
+                <a:solidFill>
+                  <a:srgbClr val="000000"/>
+                </a:solidFill>
+                <a:latin typeface="Open Sans"/>
+              </a:rPr>
+              <a:t>oferece</a:t>
+            </a:r>
+            <a:r>
+              <a:rPr lang="en-US" sz="2500" dirty="0">
+                <a:solidFill>
+                  <a:srgbClr val="000000"/>
+                </a:solidFill>
+                <a:latin typeface="Open Sans"/>
+              </a:rPr>
+              <a:t> a </a:t>
+            </a:r>
+            <a:r>
+              <a:rPr lang="en-US" sz="2500" dirty="0" err="1">
+                <a:solidFill>
+                  <a:srgbClr val="000000"/>
+                </a:solidFill>
+                <a:latin typeface="Open Sans"/>
+              </a:rPr>
+              <a:t>abrangência</a:t>
+            </a:r>
+            <a:endParaRPr lang="en-US" sz="2500" dirty="0">
+              <a:solidFill>
+                <a:srgbClr val="000000"/>
+              </a:solidFill>
+              <a:latin typeface="Open Sans"/>
+            </a:endParaRPr>
           </a:p>
           <a:p>
             <a:pPr algn="ctr">
@@ -4802,7 +5350,7 @@
               </a:lnSpc>
             </a:pPr>
             <a:r>
-              <a:rPr lang="en-US" sz="2500">
+              <a:rPr lang="en-US" sz="2500" dirty="0">
                 <a:solidFill>
                   <a:srgbClr val="000000"/>
                 </a:solidFill>
@@ -4811,7 +5359,7 @@
               <a:t>de um </a:t>
             </a:r>
             <a:r>
-              <a:rPr lang="en-US" sz="2500">
+              <a:rPr lang="en-US" sz="2500" dirty="0">
                 <a:solidFill>
                   <a:srgbClr val="000000"/>
                 </a:solidFill>
@@ -4820,7 +5368,7 @@
               <a:t>data lake </a:t>
             </a:r>
             <a:r>
-              <a:rPr lang="en-US" sz="2500">
+              <a:rPr lang="en-US" sz="2500" dirty="0">
                 <a:solidFill>
                   <a:srgbClr val="000000"/>
                 </a:solidFill>
@@ -4836,13 +5384,22 @@
               </a:lnSpc>
             </a:pPr>
             <a:r>
-              <a:rPr lang="en-US" sz="2500">
-                <a:solidFill>
-                  <a:srgbClr val="000000"/>
-                </a:solidFill>
-                <a:latin typeface="Open Sans"/>
-              </a:rPr>
-              <a:t>processamento (ETL) de um </a:t>
+              <a:rPr lang="en-US" sz="2500" dirty="0" err="1">
+                <a:solidFill>
+                  <a:srgbClr val="000000"/>
+                </a:solidFill>
+                <a:latin typeface="Open Sans"/>
+              </a:rPr>
+              <a:t>processamento</a:t>
+            </a:r>
+            <a:r>
+              <a:rPr lang="en-US" sz="2500" dirty="0">
+                <a:solidFill>
+                  <a:srgbClr val="000000"/>
+                </a:solidFill>
+                <a:latin typeface="Open Sans"/>
+              </a:rPr>
+              <a:t> (ETL) de um </a:t>
             </a:r>
           </a:p>
           <a:p>
@@ -4852,7 +5409,7 @@
               </a:lnSpc>
             </a:pPr>
             <a:r>
-              <a:rPr lang="en-US" sz="2500">
+              <a:rPr lang="en-US" sz="2500" dirty="0">
                 <a:solidFill>
                   <a:srgbClr val="000000"/>
                 </a:solidFill>
@@ -4861,14 +5418,29 @@
               <a:t>data warehouse</a:t>
             </a:r>
             <a:r>
-              <a:rPr lang="en-US" sz="2500">
-                <a:solidFill>
-                  <a:srgbClr val="000000"/>
-                </a:solidFill>
-                <a:latin typeface="Open Sans"/>
-              </a:rPr>
-              <a:t>, porém</a:t>
-            </a:r>
+              <a:rPr lang="en-US" sz="2500" dirty="0">
+                <a:solidFill>
+                  <a:srgbClr val="000000"/>
+                </a:solidFill>
+                <a:latin typeface="Open Sans"/>
+              </a:rPr>
+              <a:t>, </a:t>
+            </a:r>
+            <a:r>
+              <a:rPr lang="en-US" sz="2500" dirty="0" err="1">
+                <a:solidFill>
+                  <a:srgbClr val="000000"/>
+                </a:solidFill>
+                <a:latin typeface="Open Sans"/>
+              </a:rPr>
+              <a:t>porém</a:t>
+            </a:r>
+            <a:endParaRPr lang="en-US" sz="2500" dirty="0">
+              <a:solidFill>
+                <a:srgbClr val="000000"/>
+              </a:solidFill>
+              <a:latin typeface="Open Sans"/>
+            </a:endParaRPr>
           </a:p>
           <a:p>
             <a:pPr algn="ctr">
@@ -4877,13 +5449,76 @@
               </a:lnSpc>
             </a:pPr>
             <a:r>
-              <a:rPr lang="en-US" sz="2500">
-                <a:solidFill>
-                  <a:srgbClr val="000000"/>
-                </a:solidFill>
-                <a:latin typeface="Open Sans"/>
-              </a:rPr>
-              <a:t>mais eficaz e de baixo custo:</a:t>
+              <a:rPr lang="en-US" sz="2500" dirty="0" err="1">
+                <a:solidFill>
+                  <a:srgbClr val="000000"/>
+                </a:solidFill>
+                <a:latin typeface="Open Sans"/>
+              </a:rPr>
+              <a:t>mais</a:t>
+            </a:r>
+            <a:r>
+              <a:rPr lang="en-US" sz="2500" dirty="0">
+                <a:solidFill>
+                  <a:srgbClr val="000000"/>
+                </a:solidFill>
+                <a:latin typeface="Open Sans"/>
+              </a:rPr>
+              <a:t> </a:t>
+            </a:r>
+            <a:r>
+              <a:rPr lang="en-US" sz="2500" dirty="0" err="1">
+                <a:solidFill>
+                  <a:srgbClr val="000000"/>
+                </a:solidFill>
+                <a:latin typeface="Open Sans"/>
+              </a:rPr>
+              <a:t>eficaz</a:t>
+            </a:r>
+            <a:r>
+              <a:rPr lang="en-US" sz="2500" dirty="0">
+                <a:solidFill>
+                  <a:srgbClr val="000000"/>
+                </a:solidFill>
+                <a:latin typeface="Open Sans"/>
+              </a:rPr>
+              <a:t> e de </a:t>
+            </a:r>
+            <a:r>
+              <a:rPr lang="en-US" sz="2500" dirty="0" err="1">
+                <a:solidFill>
+                  <a:srgbClr val="000000"/>
+                </a:solidFill>
+                <a:latin typeface="Open Sans"/>
+              </a:rPr>
+              <a:t>baixo</a:t>
+            </a:r>
+            <a:r>
+              <a:rPr lang="en-US" sz="2500" dirty="0">
+                <a:solidFill>
+                  <a:srgbClr val="000000"/>
+                </a:solidFill>
+                <a:latin typeface="Open Sans"/>
+              </a:rPr>
+              <a:t> </a:t>
+            </a:r>
+            <a:r>
+              <a:rPr lang="en-US" sz="2500" dirty="0" err="1">
+                <a:solidFill>
+                  <a:srgbClr val="000000"/>
+                </a:solidFill>
+                <a:latin typeface="Open Sans"/>
+              </a:rPr>
+              <a:t>custo</a:t>
+            </a:r>
+            <a:r>
+              <a:rPr lang="en-US" sz="2500" dirty="0">
+                <a:solidFill>
+                  <a:srgbClr val="000000"/>
+                </a:solidFill>
+                <a:latin typeface="Open Sans"/>
+              </a:rPr>
+              <a:t>:</a:t>
             </a:r>
           </a:p>
           <a:p>
@@ -4893,23 +5528,74 @@
               </a:lnSpc>
             </a:pPr>
             <a:r>
-              <a:rPr lang="en-US" sz="2500">
+              <a:rPr lang="en-US" sz="2500" dirty="0">
                 <a:solidFill>
                   <a:srgbClr val="000000"/>
                 </a:solidFill>
                 <a:latin typeface="Open Sans Italics"/>
               </a:rPr>
-              <a:t>data lakehouse</a:t>
-            </a:r>
-            <a:r>
-              <a:rPr lang="en-US" sz="2500">
-                <a:solidFill>
-                  <a:srgbClr val="000000"/>
-                </a:solidFill>
-                <a:latin typeface="Open Sans"/>
-              </a:rPr>
-              <a:t>.</a:t>
-            </a:r>
+              <a:t>data </a:t>
+            </a:r>
+            <a:r>
+              <a:rPr lang="en-US" sz="2500" dirty="0" err="1">
+                <a:solidFill>
+                  <a:srgbClr val="000000"/>
+                </a:solidFill>
+                <a:latin typeface="Open Sans Italics"/>
+              </a:rPr>
+              <a:t>lakehouse</a:t>
+            </a:r>
+            <a:r>
+              <a:rPr lang="en-US" sz="2500" dirty="0">
+                <a:solidFill>
+                  <a:srgbClr val="000000"/>
+                </a:solidFill>
+                <a:latin typeface="Open Sans Italics"/>
+              </a:rPr>
+              <a:t> com </a:t>
+            </a:r>
+            <a:r>
+              <a:rPr lang="en-US" sz="2500" dirty="0" err="1">
+                <a:solidFill>
+                  <a:srgbClr val="000000"/>
+                </a:solidFill>
+                <a:latin typeface="Open Sans Italics"/>
+              </a:rPr>
+              <a:t>suporte</a:t>
+            </a:r>
+            <a:r>
+              <a:rPr lang="en-US" sz="2500" dirty="0">
+                <a:solidFill>
+                  <a:srgbClr val="000000"/>
+                </a:solidFill>
+                <a:latin typeface="Open Sans Italics"/>
+              </a:rPr>
+              <a:t> à </a:t>
+            </a:r>
+            <a:r>
+              <a:rPr lang="pt-BR" sz="2500" dirty="0">
+                <a:solidFill>
+                  <a:srgbClr val="000000"/>
+                </a:solidFill>
+                <a:latin typeface="Open Sans Italics"/>
+              </a:rPr>
+              <a:t>Atomicidade, Consistência, Isolamento </a:t>
+            </a:r>
+            <a:r>
+              <a:rPr lang="pt-BR" sz="2500">
+                <a:solidFill>
+                  <a:srgbClr val="000000"/>
+                </a:solidFill>
+                <a:latin typeface="Open Sans Italics"/>
+              </a:rPr>
+              <a:t>e Durabilidade (ACID).</a:t>
+            </a:r>
+            <a:endParaRPr lang="en-US" sz="2500" dirty="0">
+              <a:solidFill>
+                <a:srgbClr val="000000"/>
+              </a:solidFill>
+              <a:latin typeface="Open Sans"/>
+            </a:endParaRPr>
           </a:p>
         </p:txBody>
       </p:sp>
@@ -5011,6 +5697,13 @@
             </a:stretch>
           </a:blipFill>
         </p:spPr>
+        <p:txBody>
+          <a:bodyPr/>
+          <a:lstStyle/>
+          <a:p>
+            <a:endParaRPr lang="pt-BR"/>
+          </a:p>
+        </p:txBody>
       </p:sp>
       <p:sp>
         <p:nvSpPr>
@@ -5057,6 +5750,13 @@
             </a:stretch>
           </a:blipFill>
         </p:spPr>
+        <p:txBody>
+          <a:bodyPr/>
+          <a:lstStyle/>
+          <a:p>
+            <a:endParaRPr lang="pt-BR"/>
+          </a:p>
+        </p:txBody>
       </p:sp>
       <p:sp>
         <p:nvSpPr>
@@ -5103,6 +5803,13 @@
             </a:stretch>
           </a:blipFill>
         </p:spPr>
+        <p:txBody>
+          <a:bodyPr/>
+          <a:lstStyle/>
+          <a:p>
+            <a:endParaRPr lang="pt-BR"/>
+          </a:p>
+        </p:txBody>
       </p:sp>
       <p:sp>
         <p:nvSpPr>
@@ -5149,6 +5856,13 @@
             </a:stretch>
           </a:blipFill>
         </p:spPr>
+        <p:txBody>
+          <a:bodyPr/>
+          <a:lstStyle/>
+          <a:p>
+            <a:endParaRPr lang="pt-BR"/>
+          </a:p>
+        </p:txBody>
       </p:sp>
       <p:sp>
         <p:nvSpPr>
@@ -5674,7 +6388,7 @@
         </p:nvSpPr>
         <p:spPr>
           <a:xfrm>
-            <a:off x="12398685" y="7876932"/>
+            <a:off x="12573000" y="8369591"/>
             <a:ext cx="1399952" cy="1381368"/>
           </a:xfrm>
           <a:custGeom>
@@ -5711,6 +6425,13 @@
             </a:stretch>
           </a:blipFill>
         </p:spPr>
+        <p:txBody>
+          <a:bodyPr/>
+          <a:lstStyle/>
+          <a:p>
+            <a:endParaRPr lang="pt-BR"/>
+          </a:p>
+        </p:txBody>
       </p:sp>
       <p:sp>
         <p:nvSpPr>
@@ -5777,14 +6498,20 @@
               </a:lnSpc>
             </a:pPr>
             <a:r>
-              <a:rPr lang="en-US" sz="2500">
+              <a:rPr lang="en-US" sz="2500" dirty="0" err="1">
                 <a:solidFill>
                   <a:srgbClr val="000000"/>
                 </a:solidFill>
                 <a:latin typeface="Open Sans Bold"/>
               </a:rPr>
-              <a:t>Extração SQL</a:t>
-            </a:r>
+              <a:t>Extração</a:t>
+            </a:r>
+            <a:endParaRPr lang="en-US" sz="2500" dirty="0">
+              <a:solidFill>
+                <a:srgbClr val="000000"/>
+              </a:solidFill>
+              <a:latin typeface="Open Sans Bold"/>
+            </a:endParaRPr>
           </a:p>
         </p:txBody>
       </p:sp>
@@ -5797,7 +6524,7 @@
         <p:spPr>
           <a:xfrm>
             <a:off x="2184081" y="4012502"/>
-            <a:ext cx="5309063" cy="356234"/>
+            <a:ext cx="5309063" cy="1092222"/>
           </a:xfrm>
           <a:prstGeom prst="rect">
             <a:avLst/>
@@ -5817,14 +6544,146 @@
               <a:buChar char="•"/>
             </a:pPr>
             <a:r>
-              <a:rPr lang="en-US" sz="2100">
-                <a:solidFill>
-                  <a:srgbClr val="000000"/>
-                </a:solidFill>
-                <a:latin typeface="Open Sans"/>
-              </a:rPr>
-              <a:t>Acionamento conforme agendamento</a:t>
-            </a:r>
+              <a:rPr lang="en-US" sz="2100" dirty="0" err="1">
+                <a:solidFill>
+                  <a:srgbClr val="000000"/>
+                </a:solidFill>
+                <a:latin typeface="Open Sans"/>
+              </a:rPr>
+              <a:t>Acionamento</a:t>
+            </a:r>
+            <a:r>
+              <a:rPr lang="en-US" sz="2100" dirty="0">
+                <a:solidFill>
+                  <a:srgbClr val="000000"/>
+                </a:solidFill>
+                <a:latin typeface="Open Sans"/>
+              </a:rPr>
+              <a:t> </a:t>
+            </a:r>
+            <a:r>
+              <a:rPr lang="en-US" sz="2100" dirty="0" err="1">
+                <a:solidFill>
+                  <a:srgbClr val="000000"/>
+                </a:solidFill>
+                <a:latin typeface="Open Sans"/>
+              </a:rPr>
+              <a:t>conforme</a:t>
+            </a:r>
+            <a:r>
+              <a:rPr lang="en-US" sz="2100" dirty="0">
+                <a:solidFill>
+                  <a:srgbClr val="000000"/>
+                </a:solidFill>
+                <a:latin typeface="Open Sans"/>
+              </a:rPr>
+              <a:t> </a:t>
+            </a:r>
+            <a:r>
+              <a:rPr lang="en-US" sz="2100" dirty="0" err="1">
+                <a:solidFill>
+                  <a:srgbClr val="000000"/>
+                </a:solidFill>
+                <a:latin typeface="Open Sans"/>
+              </a:rPr>
+              <a:t>agendamento</a:t>
+            </a:r>
+            <a:r>
+              <a:rPr lang="en-US" sz="2100" dirty="0">
+                <a:solidFill>
+                  <a:srgbClr val="000000"/>
+                </a:solidFill>
+                <a:latin typeface="Open Sans"/>
+              </a:rPr>
+              <a:t> </a:t>
+            </a:r>
+            <a:r>
+              <a:rPr lang="en-US" sz="2100" dirty="0" err="1">
+                <a:solidFill>
+                  <a:srgbClr val="000000"/>
+                </a:solidFill>
+                <a:latin typeface="Open Sans"/>
+              </a:rPr>
+              <a:t>cron</a:t>
+            </a:r>
+            <a:r>
+              <a:rPr lang="en-US" sz="2100" dirty="0">
+                <a:solidFill>
+                  <a:srgbClr val="000000"/>
+                </a:solidFill>
+                <a:latin typeface="Open Sans"/>
+              </a:rPr>
+              <a:t> </a:t>
+            </a:r>
+            <a:r>
+              <a:rPr lang="en-US" sz="2100" dirty="0" err="1">
+                <a:solidFill>
+                  <a:srgbClr val="000000"/>
+                </a:solidFill>
+                <a:latin typeface="Open Sans"/>
+              </a:rPr>
+              <a:t>ou</a:t>
+            </a:r>
+            <a:r>
+              <a:rPr lang="en-US" sz="2100" dirty="0">
+                <a:solidFill>
+                  <a:srgbClr val="000000"/>
+                </a:solidFill>
+                <a:latin typeface="Open Sans"/>
+              </a:rPr>
+              <a:t> </a:t>
+            </a:r>
+            <a:r>
+              <a:rPr lang="en-US" sz="2100" dirty="0" err="1">
+                <a:solidFill>
+                  <a:srgbClr val="000000"/>
+                </a:solidFill>
+                <a:latin typeface="Open Sans"/>
+              </a:rPr>
+              <a:t>mensagens</a:t>
+            </a:r>
+            <a:r>
+              <a:rPr lang="en-US" sz="2100" dirty="0">
+                <a:solidFill>
+                  <a:srgbClr val="000000"/>
+                </a:solidFill>
+                <a:latin typeface="Open Sans"/>
+              </a:rPr>
+              <a:t> Apache Kafka </a:t>
+            </a:r>
+            <a:r>
+              <a:rPr lang="en-US" sz="2100" dirty="0" err="1">
+                <a:solidFill>
+                  <a:srgbClr val="000000"/>
+                </a:solidFill>
+                <a:latin typeface="Open Sans"/>
+              </a:rPr>
+              <a:t>ou</a:t>
+            </a:r>
+            <a:r>
+              <a:rPr lang="en-US" sz="2100" dirty="0">
+                <a:solidFill>
+                  <a:srgbClr val="000000"/>
+                </a:solidFill>
+                <a:latin typeface="Open Sans"/>
+              </a:rPr>
+              <a:t> rabbit </a:t>
+            </a:r>
+            <a:r>
+              <a:rPr lang="en-US" sz="2100" dirty="0" err="1">
+                <a:solidFill>
+                  <a:srgbClr val="000000"/>
+                </a:solidFill>
+                <a:latin typeface="Open Sans"/>
+              </a:rPr>
+              <a:t>mq</a:t>
+            </a:r>
+            <a:endParaRPr lang="en-US" sz="2100" dirty="0">
+              <a:solidFill>
+                <a:srgbClr val="000000"/>
+              </a:solidFill>
+              <a:latin typeface="Open Sans"/>
+            </a:endParaRPr>
           </a:p>
         </p:txBody>
       </p:sp>
@@ -5836,7 +6695,7 @@
         </p:nvSpPr>
         <p:spPr>
           <a:xfrm>
-            <a:off x="2183215" y="6316919"/>
+            <a:off x="2183215" y="6903087"/>
             <a:ext cx="6383594" cy="1099184"/>
           </a:xfrm>
           <a:prstGeom prst="rect">
@@ -5857,16 +6716,43 @@
               <a:buChar char="•"/>
             </a:pPr>
             <a:r>
-              <a:rPr lang="en-US" sz="2100">
-                <a:solidFill>
-                  <a:srgbClr val="000000"/>
-                </a:solidFill>
-                <a:latin typeface="Open Sans"/>
-              </a:rPr>
-              <a:t>Aplicação executada no ECS via </a:t>
-            </a:r>
-            <a:r>
-              <a:rPr lang="en-US" sz="2100">
+              <a:rPr lang="en-US" sz="2100" dirty="0" err="1">
+                <a:solidFill>
+                  <a:srgbClr val="000000"/>
+                </a:solidFill>
+                <a:latin typeface="Open Sans"/>
+              </a:rPr>
+              <a:t>Aplicação</a:t>
+            </a:r>
+            <a:r>
+              <a:rPr lang="en-US" sz="2100" dirty="0">
+                <a:solidFill>
+                  <a:srgbClr val="000000"/>
+                </a:solidFill>
+                <a:latin typeface="Open Sans"/>
+              </a:rPr>
+              <a:t> </a:t>
+            </a:r>
+            <a:r>
+              <a:rPr lang="en-US" sz="2100" dirty="0" err="1">
+                <a:solidFill>
+                  <a:srgbClr val="000000"/>
+                </a:solidFill>
+                <a:latin typeface="Open Sans"/>
+              </a:rPr>
+              <a:t>executada</a:t>
+            </a:r>
+            <a:r>
+              <a:rPr lang="en-US" sz="2100" dirty="0">
+                <a:solidFill>
+                  <a:srgbClr val="000000"/>
+                </a:solidFill>
+                <a:latin typeface="Open Sans"/>
+              </a:rPr>
+              <a:t> no ECS via </a:t>
+            </a:r>
+            <a:r>
+              <a:rPr lang="en-US" sz="2100" dirty="0" err="1">
                 <a:solidFill>
                   <a:srgbClr val="000000"/>
                 </a:solidFill>
@@ -5875,16 +6761,106 @@
               <a:t>Fargate</a:t>
             </a:r>
             <a:r>
-              <a:rPr lang="en-US" sz="2100">
-                <a:solidFill>
-                  <a:srgbClr val="000000"/>
-                </a:solidFill>
-                <a:latin typeface="Open Sans"/>
-              </a:rPr>
-              <a:t> pois, a depender do volume de dados, o tempo de execução pode exceder o limite da </a:t>
-            </a:r>
-            <a:r>
-              <a:rPr lang="en-US" sz="2100">
+              <a:rPr lang="en-US" sz="2100" dirty="0">
+                <a:solidFill>
+                  <a:srgbClr val="000000"/>
+                </a:solidFill>
+                <a:latin typeface="Open Sans"/>
+              </a:rPr>
+              <a:t> pois, a </a:t>
+            </a:r>
+            <a:r>
+              <a:rPr lang="en-US" sz="2100" dirty="0" err="1">
+                <a:solidFill>
+                  <a:srgbClr val="000000"/>
+                </a:solidFill>
+                <a:latin typeface="Open Sans"/>
+              </a:rPr>
+              <a:t>depender</a:t>
+            </a:r>
+            <a:r>
+              <a:rPr lang="en-US" sz="2100" dirty="0">
+                <a:solidFill>
+                  <a:srgbClr val="000000"/>
+                </a:solidFill>
+                <a:latin typeface="Open Sans"/>
+              </a:rPr>
+              <a:t> do volume de dados, o tempo de </a:t>
+            </a:r>
+            <a:r>
+              <a:rPr lang="en-US" sz="2100" dirty="0" err="1">
+                <a:solidFill>
+                  <a:srgbClr val="000000"/>
+                </a:solidFill>
+                <a:latin typeface="Open Sans"/>
+              </a:rPr>
+              <a:t>execução</a:t>
+            </a:r>
+            <a:r>
+              <a:rPr lang="en-US" sz="2100" dirty="0">
+                <a:solidFill>
+                  <a:srgbClr val="000000"/>
+                </a:solidFill>
+                <a:latin typeface="Open Sans"/>
+              </a:rPr>
+              <a:t> </a:t>
+            </a:r>
+            <a:r>
+              <a:rPr lang="en-US" sz="2100" dirty="0" err="1">
+                <a:solidFill>
+                  <a:srgbClr val="000000"/>
+                </a:solidFill>
+                <a:latin typeface="Open Sans"/>
+              </a:rPr>
+              <a:t>pode</a:t>
+            </a:r>
+            <a:r>
+              <a:rPr lang="en-US" sz="2100" dirty="0">
+                <a:solidFill>
+                  <a:srgbClr val="000000"/>
+                </a:solidFill>
+                <a:latin typeface="Open Sans"/>
+              </a:rPr>
+              <a:t> </a:t>
+            </a:r>
+            <a:r>
+              <a:rPr lang="en-US" sz="2100" dirty="0" err="1">
+                <a:solidFill>
+                  <a:srgbClr val="000000"/>
+                </a:solidFill>
+                <a:latin typeface="Open Sans"/>
+              </a:rPr>
+              <a:t>exceder</a:t>
+            </a:r>
+            <a:r>
+              <a:rPr lang="en-US" sz="2100" dirty="0">
+                <a:solidFill>
+                  <a:srgbClr val="000000"/>
+                </a:solidFill>
+                <a:latin typeface="Open Sans"/>
+              </a:rPr>
+              <a:t> o </a:t>
+            </a:r>
+            <a:r>
+              <a:rPr lang="en-US" sz="2100" dirty="0" err="1">
+                <a:solidFill>
+                  <a:srgbClr val="000000"/>
+                </a:solidFill>
+                <a:latin typeface="Open Sans"/>
+              </a:rPr>
+              <a:t>limite</a:t>
+            </a:r>
+            <a:r>
+              <a:rPr lang="en-US" sz="2100" dirty="0">
+                <a:solidFill>
+                  <a:srgbClr val="000000"/>
+                </a:solidFill>
+                <a:latin typeface="Open Sans"/>
+              </a:rPr>
+              <a:t> da </a:t>
+            </a:r>
+            <a:r>
+              <a:rPr lang="en-US" sz="2100" dirty="0">
                 <a:solidFill>
                   <a:srgbClr val="000000"/>
                 </a:solidFill>
@@ -5893,7 +6869,7 @@
               <a:t>Lambda</a:t>
             </a:r>
             <a:r>
-              <a:rPr lang="en-US" sz="2100">
+              <a:rPr lang="en-US" sz="2100" dirty="0">
                 <a:solidFill>
                   <a:srgbClr val="000000"/>
                 </a:solidFill>
@@ -5955,7 +6931,7 @@
         </p:nvSpPr>
         <p:spPr>
           <a:xfrm>
-            <a:off x="2184750" y="5674935"/>
+            <a:off x="2183214" y="6455884"/>
             <a:ext cx="6288782" cy="356234"/>
           </a:xfrm>
           <a:prstGeom prst="rect">
@@ -5976,14 +6952,74 @@
               <a:buChar char="•"/>
             </a:pPr>
             <a:r>
-              <a:rPr lang="en-US" sz="2100">
-                <a:solidFill>
-                  <a:srgbClr val="000000"/>
-                </a:solidFill>
-                <a:latin typeface="Open Sans"/>
-              </a:rPr>
-              <a:t>Baixa utilização de memória e processamento</a:t>
-            </a:r>
+              <a:rPr lang="en-US" sz="2100" dirty="0" err="1">
+                <a:solidFill>
+                  <a:srgbClr val="000000"/>
+                </a:solidFill>
+                <a:latin typeface="Open Sans"/>
+              </a:rPr>
+              <a:t>Baixa</a:t>
+            </a:r>
+            <a:r>
+              <a:rPr lang="en-US" sz="2100" dirty="0">
+                <a:solidFill>
+                  <a:srgbClr val="000000"/>
+                </a:solidFill>
+                <a:latin typeface="Open Sans"/>
+              </a:rPr>
+              <a:t> </a:t>
+            </a:r>
+            <a:r>
+              <a:rPr lang="en-US" sz="2100" dirty="0" err="1">
+                <a:solidFill>
+                  <a:srgbClr val="000000"/>
+                </a:solidFill>
+                <a:latin typeface="Open Sans"/>
+              </a:rPr>
+              <a:t>utilização</a:t>
+            </a:r>
+            <a:r>
+              <a:rPr lang="en-US" sz="2100" dirty="0">
+                <a:solidFill>
+                  <a:srgbClr val="000000"/>
+                </a:solidFill>
+                <a:latin typeface="Open Sans"/>
+              </a:rPr>
+              <a:t> de </a:t>
+            </a:r>
+            <a:r>
+              <a:rPr lang="en-US" sz="2100" dirty="0" err="1">
+                <a:solidFill>
+                  <a:srgbClr val="000000"/>
+                </a:solidFill>
+                <a:latin typeface="Open Sans"/>
+              </a:rPr>
+              <a:t>memória</a:t>
+            </a:r>
+            <a:r>
+              <a:rPr lang="en-US" sz="2100" dirty="0">
+                <a:solidFill>
+                  <a:srgbClr val="000000"/>
+                </a:solidFill>
+                <a:latin typeface="Open Sans"/>
+              </a:rPr>
+              <a:t> e </a:t>
+            </a:r>
+            <a:r>
+              <a:rPr lang="en-US" sz="2100" dirty="0" err="1">
+                <a:solidFill>
+                  <a:srgbClr val="000000"/>
+                </a:solidFill>
+                <a:latin typeface="Open Sans"/>
+              </a:rPr>
+              <a:t>processamento</a:t>
+            </a:r>
+            <a:endParaRPr lang="en-US" sz="2100" dirty="0">
+              <a:solidFill>
+                <a:srgbClr val="000000"/>
+              </a:solidFill>
+              <a:latin typeface="Open Sans"/>
+            </a:endParaRPr>
           </a:p>
         </p:txBody>
       </p:sp>
@@ -6230,8 +7266,8 @@
         </p:nvSpPr>
         <p:spPr>
           <a:xfrm>
-            <a:off x="2183215" y="4657981"/>
-            <a:ext cx="5956942" cy="727709"/>
+            <a:off x="2210868" y="5254273"/>
+            <a:ext cx="5956942" cy="1092222"/>
           </a:xfrm>
           <a:prstGeom prst="rect">
             <a:avLst/>
@@ -6311,7 +7347,7 @@
                 </a:solidFill>
                 <a:latin typeface="Open Sans"/>
               </a:rPr>
-              <a:t>Relacional</a:t>
+              <a:t>relacional</a:t>
             </a:r>
             <a:r>
               <a:rPr lang="en-US" sz="2100" dirty="0">
@@ -6320,7 +7356,97 @@
                 </a:solidFill>
                 <a:latin typeface="Open Sans"/>
               </a:rPr>
-              <a:t> para o Data Lake</a:t>
+              <a:t> </a:t>
+            </a:r>
+            <a:r>
+              <a:rPr lang="en-US" sz="2100" dirty="0" err="1">
+                <a:solidFill>
+                  <a:srgbClr val="000000"/>
+                </a:solidFill>
+                <a:latin typeface="Open Sans"/>
+              </a:rPr>
+              <a:t>ou</a:t>
+            </a:r>
+            <a:r>
+              <a:rPr lang="en-US" sz="2100" dirty="0">
+                <a:solidFill>
+                  <a:srgbClr val="000000"/>
+                </a:solidFill>
+                <a:latin typeface="Open Sans"/>
+              </a:rPr>
+              <a:t> </a:t>
+            </a:r>
+            <a:r>
+              <a:rPr lang="en-US" sz="2100" dirty="0" err="1">
+                <a:solidFill>
+                  <a:srgbClr val="000000"/>
+                </a:solidFill>
+                <a:latin typeface="Open Sans"/>
+              </a:rPr>
+              <a:t>envio</a:t>
+            </a:r>
+            <a:r>
+              <a:rPr lang="en-US" sz="2100" dirty="0">
+                <a:solidFill>
+                  <a:srgbClr val="000000"/>
+                </a:solidFill>
+                <a:latin typeface="Open Sans"/>
+              </a:rPr>
+              <a:t> de </a:t>
+            </a:r>
+            <a:r>
+              <a:rPr lang="en-US" sz="2100" dirty="0" err="1">
+                <a:solidFill>
+                  <a:srgbClr val="000000"/>
+                </a:solidFill>
+                <a:latin typeface="Open Sans"/>
+              </a:rPr>
+              <a:t>tópicos</a:t>
+            </a:r>
+            <a:r>
+              <a:rPr lang="en-US" sz="2100" dirty="0">
+                <a:solidFill>
+                  <a:srgbClr val="000000"/>
+                </a:solidFill>
+                <a:latin typeface="Open Sans"/>
+              </a:rPr>
+              <a:t> </a:t>
+            </a:r>
+            <a:r>
+              <a:rPr lang="en-US" sz="2100" dirty="0" err="1">
+                <a:solidFill>
+                  <a:srgbClr val="000000"/>
+                </a:solidFill>
+                <a:latin typeface="Open Sans"/>
+              </a:rPr>
+              <a:t>kafka</a:t>
+            </a:r>
+            <a:r>
+              <a:rPr lang="en-US" sz="2100" dirty="0">
+                <a:solidFill>
+                  <a:srgbClr val="000000"/>
+                </a:solidFill>
+                <a:latin typeface="Open Sans"/>
+              </a:rPr>
+              <a:t> e dados </a:t>
+            </a:r>
+            <a:r>
+              <a:rPr lang="en-US" sz="2100" dirty="0" err="1">
+                <a:solidFill>
+                  <a:srgbClr val="000000"/>
+                </a:solidFill>
+                <a:latin typeface="Open Sans"/>
+              </a:rPr>
+              <a:t>em</a:t>
+            </a:r>
+            <a:r>
+              <a:rPr lang="en-US" sz="2100" dirty="0">
+                <a:solidFill>
+                  <a:srgbClr val="000000"/>
+                </a:solidFill>
+                <a:latin typeface="Open Sans"/>
+              </a:rPr>
+              <a:t> batch para o Data Lake</a:t>
             </a:r>
           </a:p>
         </p:txBody>
@@ -6521,7 +7647,7 @@
         </p:nvGrpSpPr>
         <p:grpSpPr>
           <a:xfrm>
-            <a:off x="4130996" y="7876932"/>
+            <a:off x="4130996" y="8369591"/>
             <a:ext cx="2061380" cy="1381368"/>
             <a:chOff x="0" y="0"/>
             <a:chExt cx="2748507" cy="1841825"/>
@@ -6572,6 +7698,13 @@
               </a:stretch>
             </a:blipFill>
           </p:spPr>
+          <p:txBody>
+            <a:bodyPr/>
+            <a:lstStyle/>
+            <a:p>
+              <a:endParaRPr lang="pt-BR"/>
+            </a:p>
+          </p:txBody>
         </p:sp>
         <p:sp>
           <p:nvSpPr>
@@ -6618,6 +7751,13 @@
               </a:stretch>
             </a:blipFill>
           </p:spPr>
+          <p:txBody>
+            <a:bodyPr/>
+            <a:lstStyle/>
+            <a:p>
+              <a:endParaRPr lang="pt-BR"/>
+            </a:p>
+          </p:txBody>
         </p:sp>
         <p:sp>
           <p:nvSpPr>
@@ -6900,6 +8040,13 @@
               </a:stretch>
             </a:blipFill>
           </p:spPr>
+          <p:txBody>
+            <a:bodyPr/>
+            <a:lstStyle/>
+            <a:p>
+              <a:endParaRPr lang="pt-BR"/>
+            </a:p>
+          </p:txBody>
         </p:sp>
         <p:sp>
           <p:nvSpPr>
@@ -6946,6 +8093,13 @@
               </a:stretch>
             </a:blipFill>
           </p:spPr>
+          <p:txBody>
+            <a:bodyPr/>
+            <a:lstStyle/>
+            <a:p>
+              <a:endParaRPr lang="pt-BR"/>
+            </a:p>
+          </p:txBody>
         </p:sp>
         <p:sp>
           <p:nvSpPr>
@@ -7031,6 +8185,13 @@
             </a:stretch>
           </a:blipFill>
         </p:spPr>
+        <p:txBody>
+          <a:bodyPr/>
+          <a:lstStyle/>
+          <a:p>
+            <a:endParaRPr lang="pt-BR"/>
+          </a:p>
+        </p:txBody>
       </p:sp>
       <p:sp>
         <p:nvSpPr>
@@ -7077,6 +8238,13 @@
             </a:stretch>
           </a:blipFill>
         </p:spPr>
+        <p:txBody>
+          <a:bodyPr/>
+          <a:lstStyle/>
+          <a:p>
+            <a:endParaRPr lang="pt-BR"/>
+          </a:p>
+        </p:txBody>
       </p:sp>
       <p:grpSp>
         <p:nvGrpSpPr>
@@ -7166,6 +8334,13 @@
               </a:srgbClr>
             </a:solidFill>
           </p:spPr>
+          <p:txBody>
+            <a:bodyPr/>
+            <a:lstStyle/>
+            <a:p>
+              <a:endParaRPr lang="pt-BR"/>
+            </a:p>
+          </p:txBody>
         </p:sp>
         <p:sp>
           <p:nvSpPr>
@@ -7320,8 +8495,8 @@
         </p:nvSpPr>
         <p:spPr>
           <a:xfrm>
-            <a:off x="1193126" y="5931078"/>
-            <a:ext cx="7284303" cy="1099184"/>
+            <a:off x="1193126" y="5911152"/>
+            <a:ext cx="7284303" cy="720325"/>
           </a:xfrm>
           <a:prstGeom prst="rect">
             <a:avLst/>
@@ -7341,16 +8516,43 @@
               <a:buChar char="•"/>
             </a:pPr>
             <a:r>
-              <a:rPr lang="en-US" sz="2100">
-                <a:solidFill>
-                  <a:srgbClr val="000000"/>
-                </a:solidFill>
-                <a:latin typeface="Open Sans"/>
-              </a:rPr>
-              <a:t>Aplicação executada no ECS via </a:t>
-            </a:r>
-            <a:r>
-              <a:rPr lang="en-US" sz="2100">
+              <a:rPr lang="en-US" sz="2100" dirty="0" err="1">
+                <a:solidFill>
+                  <a:srgbClr val="000000"/>
+                </a:solidFill>
+                <a:latin typeface="Open Sans"/>
+              </a:rPr>
+              <a:t>Aplicação</a:t>
+            </a:r>
+            <a:r>
+              <a:rPr lang="en-US" sz="2100" dirty="0">
+                <a:solidFill>
+                  <a:srgbClr val="000000"/>
+                </a:solidFill>
+                <a:latin typeface="Open Sans"/>
+              </a:rPr>
+              <a:t> </a:t>
+            </a:r>
+            <a:r>
+              <a:rPr lang="en-US" sz="2100" dirty="0" err="1">
+                <a:solidFill>
+                  <a:srgbClr val="000000"/>
+                </a:solidFill>
+                <a:latin typeface="Open Sans"/>
+              </a:rPr>
+              <a:t>executada</a:t>
+            </a:r>
+            <a:r>
+              <a:rPr lang="en-US" sz="2100" dirty="0">
+                <a:solidFill>
+                  <a:srgbClr val="000000"/>
+                </a:solidFill>
+                <a:latin typeface="Open Sans"/>
+              </a:rPr>
+              <a:t> no ECS via </a:t>
+            </a:r>
+            <a:r>
+              <a:rPr lang="en-US" sz="2100" dirty="0" err="1">
                 <a:solidFill>
                   <a:srgbClr val="000000"/>
                 </a:solidFill>
@@ -7359,16 +8561,88 @@
               <a:t>Fargate</a:t>
             </a:r>
             <a:r>
-              <a:rPr lang="en-US" sz="2100">
-                <a:solidFill>
-                  <a:srgbClr val="000000"/>
-                </a:solidFill>
-                <a:latin typeface="Open Sans"/>
-              </a:rPr>
-              <a:t> com 8 núcleos de processamento, 32 GB de memória RAM e tempo certamente excedente ao limite da </a:t>
-            </a:r>
-            <a:r>
-              <a:rPr lang="en-US" sz="2100">
+              <a:rPr lang="en-US" sz="2100" dirty="0">
+                <a:solidFill>
+                  <a:srgbClr val="000000"/>
+                </a:solidFill>
+                <a:latin typeface="Open Sans"/>
+              </a:rPr>
+              <a:t> com tempo </a:t>
+            </a:r>
+            <a:r>
+              <a:rPr lang="en-US" sz="2100" dirty="0" err="1">
+                <a:solidFill>
+                  <a:srgbClr val="000000"/>
+                </a:solidFill>
+                <a:latin typeface="Open Sans"/>
+              </a:rPr>
+              <a:t>certamente</a:t>
+            </a:r>
+            <a:r>
+              <a:rPr lang="en-US" sz="2100" dirty="0">
+                <a:solidFill>
+                  <a:srgbClr val="000000"/>
+                </a:solidFill>
+                <a:latin typeface="Open Sans"/>
+              </a:rPr>
+              <a:t> </a:t>
+            </a:r>
+            <a:r>
+              <a:rPr lang="en-US" sz="2100" dirty="0" err="1">
+                <a:solidFill>
+                  <a:srgbClr val="000000"/>
+                </a:solidFill>
+                <a:latin typeface="Open Sans"/>
+              </a:rPr>
+              <a:t>excedente</a:t>
+            </a:r>
+            <a:r>
+              <a:rPr lang="en-US" sz="2100" dirty="0">
+                <a:solidFill>
+                  <a:srgbClr val="000000"/>
+                </a:solidFill>
+                <a:latin typeface="Open Sans"/>
+              </a:rPr>
+              <a:t> </a:t>
+            </a:r>
+            <a:r>
+              <a:rPr lang="en-US" sz="2100" dirty="0" err="1">
+                <a:solidFill>
+                  <a:srgbClr val="000000"/>
+                </a:solidFill>
+                <a:latin typeface="Open Sans"/>
+              </a:rPr>
+              <a:t>ao</a:t>
+            </a:r>
+            <a:r>
+              <a:rPr lang="en-US" sz="2100" dirty="0">
+                <a:solidFill>
+                  <a:srgbClr val="000000"/>
+                </a:solidFill>
+                <a:latin typeface="Open Sans"/>
+              </a:rPr>
+              <a:t> </a:t>
+            </a:r>
+            <a:r>
+              <a:rPr lang="en-US" sz="2100" dirty="0" err="1">
+                <a:solidFill>
+                  <a:srgbClr val="000000"/>
+                </a:solidFill>
+                <a:latin typeface="Open Sans"/>
+              </a:rPr>
+              <a:t>limite</a:t>
+            </a:r>
+            <a:r>
+              <a:rPr lang="en-US" sz="2100" dirty="0">
+                <a:solidFill>
+                  <a:srgbClr val="000000"/>
+                </a:solidFill>
+                <a:latin typeface="Open Sans"/>
+              </a:rPr>
+              <a:t> da </a:t>
+            </a:r>
+            <a:r>
+              <a:rPr lang="en-US" sz="2100" dirty="0">
                 <a:solidFill>
                   <a:srgbClr val="000000"/>
                 </a:solidFill>
@@ -7377,7 +8651,7 @@
               <a:t>Lambda</a:t>
             </a:r>
             <a:r>
-              <a:rPr lang="en-US" sz="2100">
+              <a:rPr lang="en-US" sz="2100" dirty="0">
                 <a:solidFill>
                   <a:srgbClr val="000000"/>
                 </a:solidFill>
@@ -7756,6 +9030,13 @@
               </a:srgbClr>
             </a:solidFill>
           </p:spPr>
+          <p:txBody>
+            <a:bodyPr/>
+            <a:lstStyle/>
+            <a:p>
+              <a:endParaRPr lang="pt-BR"/>
+            </a:p>
+          </p:txBody>
         </p:sp>
         <p:sp>
           <p:nvSpPr>
@@ -7950,6 +9231,13 @@
               </a:srgbClr>
             </a:solidFill>
           </p:spPr>
+          <p:txBody>
+            <a:bodyPr/>
+            <a:lstStyle/>
+            <a:p>
+              <a:endParaRPr lang="pt-BR"/>
+            </a:p>
+          </p:txBody>
         </p:sp>
         <p:sp>
           <p:nvSpPr>
@@ -8041,6 +9329,13 @@
             <a:tailEnd type="arrow" w="med" len="sm"/>
           </a:ln>
         </p:spPr>
+        <p:txBody>
+          <a:bodyPr/>
+          <a:lstStyle/>
+          <a:p>
+            <a:endParaRPr lang="pt-BR"/>
+          </a:p>
+        </p:txBody>
       </p:sp>
       <p:sp>
         <p:nvSpPr>

</xml_diff>